<commit_message>
se hacen ajustes en la pagina de energia eolica y se actualizan documentos del proyecto
</commit_message>
<xml_diff>
--- a/Seguimientoproyecto/Fase 4 - Cierre y Lecciones aprendidas/Presentacion Final - Enerviva.pptx
+++ b/Seguimientoproyecto/Fase 4 - Cierre y Lecciones aprendidas/Presentacion Final - Enerviva.pptx
@@ -3690,8 +3690,8 @@
           <a:lstStyle/>
           <a:p>
             <a:r>
-              <a:rPr lang="es-MX" dirty="0" err="1"/>
-              <a:t>Analisis</a:t>
+              <a:rPr lang="es-MX" dirty="0"/>
+              <a:t>Análisis</a:t>
             </a:r>
             <a:endParaRPr lang="es-CO" dirty="0"/>
           </a:p>
@@ -3719,12 +3719,8 @@
           <a:lstStyle/>
           <a:p>
             <a:r>
-              <a:rPr lang="es-MX" dirty="0" err="1"/>
-              <a:t>Reflexion</a:t>
-            </a:r>
-            <a:r>
               <a:rPr lang="es-MX" dirty="0"/>
-              <a:t> sobre los resultados encontrados</a:t>
+              <a:t>Reflexión sobre los resultados encontrados</a:t>
             </a:r>
           </a:p>
           <a:p>
@@ -3806,8 +3802,8 @@
           <a:lstStyle/>
           <a:p>
             <a:r>
-              <a:rPr lang="es-MX" dirty="0" err="1"/>
-              <a:t>Presentacion</a:t>
+              <a:rPr lang="es-MX" dirty="0"/>
+              <a:t>Presentación</a:t>
             </a:r>
             <a:endParaRPr lang="es-CO" dirty="0"/>
           </a:p>

</xml_diff>